<commit_message>
Updated qr inside slides
</commit_message>
<xml_diff>
--- a/Presentation.pptx
+++ b/Presentation.pptx
@@ -141,6 +141,7 @@
 <p1510:revInfo xmlns:a="http://schemas.openxmlformats.org/drawingml/2006/main" xmlns:r="http://schemas.openxmlformats.org/officeDocument/2006/relationships" xmlns:p1510="http://schemas.microsoft.com/office/powerpoint/2015/10/main">
   <p1510:revLst>
     <p1510:client id="{6FD15090-5258-401B-ABD4-6516C6CE254B}" v="57" dt="2023-05-12T08:29:02.443"/>
+    <p1510:client id="{77237EA2-6A4F-47C3-A62A-FB7941FA2E2F}" v="2" dt="2023-05-12T08:49:29.120"/>
   </p1510:revLst>
 </p1510:revInfo>
 </file>
@@ -507,7 +508,7 @@
   <pc:docChgLst>
     <pc:chgData name="Alex Calabrese" userId="5f02cda7368e72c4" providerId="LiveId" clId="{77237EA2-6A4F-47C3-A62A-FB7941FA2E2F}"/>
     <pc:docChg chg="undo redo custSel addSld delSld modSld sldOrd">
-      <pc:chgData name="Alex Calabrese" userId="5f02cda7368e72c4" providerId="LiveId" clId="{77237EA2-6A4F-47C3-A62A-FB7941FA2E2F}" dt="2023-05-09T10:09:25.279" v="1927" actId="1076"/>
+      <pc:chgData name="Alex Calabrese" userId="5f02cda7368e72c4" providerId="LiveId" clId="{77237EA2-6A4F-47C3-A62A-FB7941FA2E2F}" dt="2023-05-12T08:49:39.048" v="1932" actId="1076"/>
       <pc:docMkLst>
         <pc:docMk/>
       </pc:docMkLst>
@@ -977,12 +978,20 @@
           <pc:sldMk cId="3353494850" sldId="268"/>
         </pc:sldMkLst>
       </pc:sldChg>
-      <pc:sldChg chg="add">
-        <pc:chgData name="Alex Calabrese" userId="5f02cda7368e72c4" providerId="LiveId" clId="{77237EA2-6A4F-47C3-A62A-FB7941FA2E2F}" dt="2023-05-03T15:49:57.083" v="219"/>
+      <pc:sldChg chg="modSp add mod">
+        <pc:chgData name="Alex Calabrese" userId="5f02cda7368e72c4" providerId="LiveId" clId="{77237EA2-6A4F-47C3-A62A-FB7941FA2E2F}" dt="2023-05-12T08:49:39.048" v="1932" actId="1076"/>
         <pc:sldMkLst>
           <pc:docMk/>
           <pc:sldMk cId="4216836499" sldId="268"/>
         </pc:sldMkLst>
+        <pc:picChg chg="mod">
+          <ac:chgData name="Alex Calabrese" userId="5f02cda7368e72c4" providerId="LiveId" clId="{77237EA2-6A4F-47C3-A62A-FB7941FA2E2F}" dt="2023-05-12T08:49:39.048" v="1932" actId="1076"/>
+          <ac:picMkLst>
+            <pc:docMk/>
+            <pc:sldMk cId="4216836499" sldId="268"/>
+            <ac:picMk id="3" creationId="{E6E95FCA-DFBA-AB6E-50E4-3E69B1C29875}"/>
+          </ac:picMkLst>
+        </pc:picChg>
       </pc:sldChg>
       <pc:sldChg chg="add">
         <pc:chgData name="Alex Calabrese" userId="5f02cda7368e72c4" providerId="LiveId" clId="{77237EA2-6A4F-47C3-A62A-FB7941FA2E2F}" dt="2023-05-03T15:50:00.060" v="220"/>
@@ -14398,15 +14407,18 @@
           <a:p>
             <a:pPr algn="ctr"/>
             <a:r>
-              <a:rPr lang="en-US" dirty="0"/>
+              <a:rPr lang="en-US" dirty="0">
+                <a:hlinkClick r:id="rId2"/>
+              </a:rPr>
               <a:t>https://github.com/alexcalabrese/semantic-kernel-demo</a:t>
             </a:r>
+            <a:endParaRPr lang="en-US" dirty="0"/>
           </a:p>
         </p:txBody>
       </p:sp>
       <p:pic>
         <p:nvPicPr>
-          <p:cNvPr id="3" name="Picture 2" descr="A qr code with a cat&#10;&#10;Description automatically generated">
+          <p:cNvPr id="3" name="Picture 2">
             <a:extLst>
               <a:ext uri="{FF2B5EF4-FFF2-40B4-BE49-F238E27FC236}">
                 <a16:creationId xmlns:a16="http://schemas.microsoft.com/office/drawing/2014/main" id="{E6E95FCA-DFBA-AB6E-50E4-3E69B1C29875}"/>
@@ -14419,21 +14431,20 @@
           <p:nvPr/>
         </p:nvPicPr>
         <p:blipFill>
-          <a:blip r:embed="rId2">
+          <a:blip r:embed="rId3">
             <a:extLst>
               <a:ext uri="{28A0092B-C50C-407E-A947-70E740481C1C}">
                 <a14:useLocalDpi xmlns:a14="http://schemas.microsoft.com/office/drawing/2010/main" val="0"/>
               </a:ext>
             </a:extLst>
           </a:blip>
-          <a:stretch>
-            <a:fillRect/>
-          </a:stretch>
+          <a:srcRect/>
+          <a:stretch/>
         </p:blipFill>
         <p:spPr>
           <a:xfrm>
-            <a:off x="4368766" y="2343786"/>
-            <a:ext cx="2941581" cy="2941581"/>
+            <a:off x="4003033" y="1981179"/>
+            <a:ext cx="3673047" cy="3673047"/>
           </a:xfrm>
           <a:prstGeom prst="rect">
             <a:avLst/>

</xml_diff>